<commit_message>
#18 updated categories mock up
</commit_message>
<xml_diff>
--- a/docs/Mock_Up.pptx
+++ b/docs/Mock_Up.pptx
@@ -7,6 +7,8 @@
   <p:sldIdLst>
     <p:sldId id="257" r:id="rId2"/>
     <p:sldId id="256" r:id="rId3"/>
+    <p:sldId id="258" r:id="rId4"/>
+    <p:sldId id="259" r:id="rId5"/>
   </p:sldIdLst>
   <p:sldSz cx="12192000" cy="6858000"/>
   <p:notesSz cx="6858000" cy="9144000"/>
@@ -105,6 +107,11 @@
       </a:defRPr>
     </a:lvl9pPr>
   </p:defaultTextStyle>
+  <p:extLst>
+    <p:ext uri="{EFAFB233-063F-42B5-8137-9DF3F51BA10A}">
+      <p15:sldGuideLst xmlns:p15="http://schemas.microsoft.com/office/powerpoint/2012/main"/>
+    </p:ext>
+  </p:extLst>
 </p:presentation>
 </file>
 
@@ -239,7 +246,7 @@
           <a:p>
             <a:fld id="{1E366D43-31D5-4172-B4EF-92311A1E8CD0}" type="datetimeFigureOut">
               <a:rPr lang="en-US" smtClean="0"/>
-              <a:t>11/26/2021</a:t>
+              <a:t>11/30/2021</a:t>
             </a:fld>
             <a:endParaRPr lang="en-US"/>
           </a:p>
@@ -409,7 +416,7 @@
           <a:p>
             <a:fld id="{1E366D43-31D5-4172-B4EF-92311A1E8CD0}" type="datetimeFigureOut">
               <a:rPr lang="en-US" smtClean="0"/>
-              <a:t>11/26/2021</a:t>
+              <a:t>11/30/2021</a:t>
             </a:fld>
             <a:endParaRPr lang="en-US"/>
           </a:p>
@@ -589,7 +596,7 @@
           <a:p>
             <a:fld id="{1E366D43-31D5-4172-B4EF-92311A1E8CD0}" type="datetimeFigureOut">
               <a:rPr lang="en-US" smtClean="0"/>
-              <a:t>11/26/2021</a:t>
+              <a:t>11/30/2021</a:t>
             </a:fld>
             <a:endParaRPr lang="en-US"/>
           </a:p>
@@ -759,7 +766,7 @@
           <a:p>
             <a:fld id="{1E366D43-31D5-4172-B4EF-92311A1E8CD0}" type="datetimeFigureOut">
               <a:rPr lang="en-US" smtClean="0"/>
-              <a:t>11/26/2021</a:t>
+              <a:t>11/30/2021</a:t>
             </a:fld>
             <a:endParaRPr lang="en-US"/>
           </a:p>
@@ -1005,7 +1012,7 @@
           <a:p>
             <a:fld id="{1E366D43-31D5-4172-B4EF-92311A1E8CD0}" type="datetimeFigureOut">
               <a:rPr lang="en-US" smtClean="0"/>
-              <a:t>11/26/2021</a:t>
+              <a:t>11/30/2021</a:t>
             </a:fld>
             <a:endParaRPr lang="en-US"/>
           </a:p>
@@ -1237,7 +1244,7 @@
           <a:p>
             <a:fld id="{1E366D43-31D5-4172-B4EF-92311A1E8CD0}" type="datetimeFigureOut">
               <a:rPr lang="en-US" smtClean="0"/>
-              <a:t>11/26/2021</a:t>
+              <a:t>11/30/2021</a:t>
             </a:fld>
             <a:endParaRPr lang="en-US"/>
           </a:p>
@@ -1604,7 +1611,7 @@
           <a:p>
             <a:fld id="{1E366D43-31D5-4172-B4EF-92311A1E8CD0}" type="datetimeFigureOut">
               <a:rPr lang="en-US" smtClean="0"/>
-              <a:t>11/26/2021</a:t>
+              <a:t>11/30/2021</a:t>
             </a:fld>
             <a:endParaRPr lang="en-US"/>
           </a:p>
@@ -1722,7 +1729,7 @@
           <a:p>
             <a:fld id="{1E366D43-31D5-4172-B4EF-92311A1E8CD0}" type="datetimeFigureOut">
               <a:rPr lang="en-US" smtClean="0"/>
-              <a:t>11/26/2021</a:t>
+              <a:t>11/30/2021</a:t>
             </a:fld>
             <a:endParaRPr lang="en-US"/>
           </a:p>
@@ -1817,7 +1824,7 @@
           <a:p>
             <a:fld id="{1E366D43-31D5-4172-B4EF-92311A1E8CD0}" type="datetimeFigureOut">
               <a:rPr lang="en-US" smtClean="0"/>
-              <a:t>11/26/2021</a:t>
+              <a:t>11/30/2021</a:t>
             </a:fld>
             <a:endParaRPr lang="en-US"/>
           </a:p>
@@ -2094,7 +2101,7 @@
           <a:p>
             <a:fld id="{1E366D43-31D5-4172-B4EF-92311A1E8CD0}" type="datetimeFigureOut">
               <a:rPr lang="en-US" smtClean="0"/>
-              <a:t>11/26/2021</a:t>
+              <a:t>11/30/2021</a:t>
             </a:fld>
             <a:endParaRPr lang="en-US"/>
           </a:p>
@@ -2347,7 +2354,7 @@
           <a:p>
             <a:fld id="{1E366D43-31D5-4172-B4EF-92311A1E8CD0}" type="datetimeFigureOut">
               <a:rPr lang="en-US" smtClean="0"/>
-              <a:t>11/26/2021</a:t>
+              <a:t>11/30/2021</a:t>
             </a:fld>
             <a:endParaRPr lang="en-US"/>
           </a:p>
@@ -2560,7 +2567,7 @@
           <a:p>
             <a:fld id="{1E366D43-31D5-4172-B4EF-92311A1E8CD0}" type="datetimeFigureOut">
               <a:rPr lang="en-US" smtClean="0"/>
-              <a:t>11/26/2021</a:t>
+              <a:t>11/30/2021</a:t>
             </a:fld>
             <a:endParaRPr lang="en-US"/>
           </a:p>
@@ -3006,7 +3013,6 @@
               <a:rPr lang="en-US" dirty="0"/>
               <a:t>Up</a:t>
             </a:r>
-            <a:endParaRPr lang="en-US" dirty="0"/>
           </a:p>
         </p:txBody>
       </p:sp>
@@ -3233,7 +3239,7 @@
         </p:nvSpPr>
         <p:spPr>
           <a:xfrm>
-            <a:off x="2999923" y="712352"/>
+            <a:off x="2999923" y="671712"/>
             <a:ext cx="6108569" cy="769441"/>
           </a:xfrm>
           <a:prstGeom prst="rect">
@@ -3265,22 +3271,28 @@
       </p:sp>
       <p:pic>
         <p:nvPicPr>
-          <p:cNvPr id="5" name="Picture 4"/>
+          <p:cNvPr id="2" name="Picture 1"/>
           <p:cNvPicPr>
             <a:picLocks noChangeAspect="1"/>
           </p:cNvPicPr>
           <p:nvPr/>
         </p:nvPicPr>
         <p:blipFill>
-          <a:blip r:embed="rId2"/>
+          <a:blip r:embed="rId2" cstate="print">
+            <a:extLst>
+              <a:ext uri="{28A0092B-C50C-407E-A947-70E740481C1C}">
+                <a14:useLocalDpi xmlns:a14="http://schemas.microsoft.com/office/drawing/2010/main" val="0"/>
+              </a:ext>
+            </a:extLst>
+          </a:blip>
           <a:stretch>
             <a:fillRect/>
           </a:stretch>
         </p:blipFill>
         <p:spPr>
           <a:xfrm>
-            <a:off x="2475013" y="1408981"/>
-            <a:ext cx="6867159" cy="4190424"/>
+            <a:off x="2524418" y="1481793"/>
+            <a:ext cx="7059577" cy="4307840"/>
           </a:xfrm>
           <a:prstGeom prst="rect">
             <a:avLst/>
@@ -3291,6 +3303,202 @@
     <p:extLst>
       <p:ext uri="{BB962C8B-B14F-4D97-AF65-F5344CB8AC3E}">
         <p14:creationId xmlns:p14="http://schemas.microsoft.com/office/powerpoint/2010/main" val="1781392023"/>
+      </p:ext>
+    </p:extLst>
+  </p:cSld>
+  <p:clrMapOvr>
+    <a:masterClrMapping/>
+  </p:clrMapOvr>
+</p:sld>
+</file>
+
+<file path=ppt/slides/slide3.xml><?xml version="1.0" encoding="utf-8"?>
+<p:sld xmlns:a="http://schemas.openxmlformats.org/drawingml/2006/main" xmlns:r="http://schemas.openxmlformats.org/officeDocument/2006/relationships" xmlns:p="http://schemas.openxmlformats.org/presentationml/2006/main">
+  <p:cSld>
+    <p:spTree>
+      <p:nvGrpSpPr>
+        <p:cNvPr id="1" name=""/>
+        <p:cNvGrpSpPr/>
+        <p:nvPr/>
+      </p:nvGrpSpPr>
+      <p:grpSpPr>
+        <a:xfrm>
+          <a:off x="0" y="0"/>
+          <a:ext cx="0" cy="0"/>
+          <a:chOff x="0" y="0"/>
+          <a:chExt cx="0" cy="0"/>
+        </a:xfrm>
+      </p:grpSpPr>
+      <p:sp>
+        <p:nvSpPr>
+          <p:cNvPr id="4" name="TextBox 3"/>
+          <p:cNvSpPr txBox="1"/>
+          <p:nvPr/>
+        </p:nvSpPr>
+        <p:spPr>
+          <a:xfrm>
+            <a:off x="3985443" y="590432"/>
+            <a:ext cx="3665037" cy="769441"/>
+          </a:xfrm>
+          <a:prstGeom prst="rect">
+            <a:avLst/>
+          </a:prstGeom>
+          <a:noFill/>
+        </p:spPr>
+        <p:txBody>
+          <a:bodyPr wrap="square" rtlCol="0">
+            <a:spAutoFit/>
+          </a:bodyPr>
+          <a:lstStyle/>
+          <a:p>
+            <a:r>
+              <a:rPr lang="en-US" sz="4400" dirty="0" smtClean="0">
+                <a:solidFill>
+                  <a:srgbClr val="FF0000"/>
+                </a:solidFill>
+              </a:rPr>
+              <a:t>Menu Mock up</a:t>
+            </a:r>
+            <a:endParaRPr lang="en-US" sz="4400" dirty="0">
+              <a:solidFill>
+                <a:srgbClr val="FF0000"/>
+              </a:solidFill>
+            </a:endParaRPr>
+          </a:p>
+        </p:txBody>
+      </p:sp>
+      <p:pic>
+        <p:nvPicPr>
+          <p:cNvPr id="5" name="Picture 4"/>
+          <p:cNvPicPr>
+            <a:picLocks noChangeAspect="1"/>
+          </p:cNvPicPr>
+          <p:nvPr/>
+        </p:nvPicPr>
+        <p:blipFill>
+          <a:blip r:embed="rId2">
+            <a:extLst>
+              <a:ext uri="{28A0092B-C50C-407E-A947-70E740481C1C}">
+                <a14:useLocalDpi xmlns:a14="http://schemas.microsoft.com/office/drawing/2010/main" val="0"/>
+              </a:ext>
+            </a:extLst>
+          </a:blip>
+          <a:stretch>
+            <a:fillRect/>
+          </a:stretch>
+        </p:blipFill>
+        <p:spPr>
+          <a:xfrm>
+            <a:off x="2354580" y="1471633"/>
+            <a:ext cx="7510780" cy="5007187"/>
+          </a:xfrm>
+          <a:prstGeom prst="rect">
+            <a:avLst/>
+          </a:prstGeom>
+        </p:spPr>
+      </p:pic>
+    </p:spTree>
+    <p:extLst>
+      <p:ext uri="{BB962C8B-B14F-4D97-AF65-F5344CB8AC3E}">
+        <p14:creationId xmlns:p14="http://schemas.microsoft.com/office/powerpoint/2010/main" val="2731533367"/>
+      </p:ext>
+    </p:extLst>
+  </p:cSld>
+  <p:clrMapOvr>
+    <a:masterClrMapping/>
+  </p:clrMapOvr>
+</p:sld>
+</file>
+
+<file path=ppt/slides/slide4.xml><?xml version="1.0" encoding="utf-8"?>
+<p:sld xmlns:a="http://schemas.openxmlformats.org/drawingml/2006/main" xmlns:r="http://schemas.openxmlformats.org/officeDocument/2006/relationships" xmlns:p="http://schemas.openxmlformats.org/presentationml/2006/main">
+  <p:cSld>
+    <p:spTree>
+      <p:nvGrpSpPr>
+        <p:cNvPr id="1" name=""/>
+        <p:cNvGrpSpPr/>
+        <p:nvPr/>
+      </p:nvGrpSpPr>
+      <p:grpSpPr>
+        <a:xfrm>
+          <a:off x="0" y="0"/>
+          <a:ext cx="0" cy="0"/>
+          <a:chOff x="0" y="0"/>
+          <a:chExt cx="0" cy="0"/>
+        </a:xfrm>
+      </p:grpSpPr>
+      <p:sp>
+        <p:nvSpPr>
+          <p:cNvPr id="4" name="TextBox 3"/>
+          <p:cNvSpPr txBox="1"/>
+          <p:nvPr/>
+        </p:nvSpPr>
+        <p:spPr>
+          <a:xfrm>
+            <a:off x="5783763" y="2876432"/>
+            <a:ext cx="4366077" cy="769441"/>
+          </a:xfrm>
+          <a:prstGeom prst="rect">
+            <a:avLst/>
+          </a:prstGeom>
+          <a:noFill/>
+        </p:spPr>
+        <p:txBody>
+          <a:bodyPr wrap="square" rtlCol="0">
+            <a:spAutoFit/>
+          </a:bodyPr>
+          <a:lstStyle/>
+          <a:p>
+            <a:r>
+              <a:rPr lang="en-US" sz="4400" dirty="0" smtClean="0">
+                <a:solidFill>
+                  <a:srgbClr val="FF0000"/>
+                </a:solidFill>
+              </a:rPr>
+              <a:t>Category Mock up</a:t>
+            </a:r>
+            <a:endParaRPr lang="en-US" sz="4400" dirty="0">
+              <a:solidFill>
+                <a:srgbClr val="FF0000"/>
+              </a:solidFill>
+            </a:endParaRPr>
+          </a:p>
+        </p:txBody>
+      </p:sp>
+      <p:pic>
+        <p:nvPicPr>
+          <p:cNvPr id="5" name="Picture 4"/>
+          <p:cNvPicPr>
+            <a:picLocks noChangeAspect="1"/>
+          </p:cNvPicPr>
+          <p:nvPr/>
+        </p:nvPicPr>
+        <p:blipFill>
+          <a:blip r:embed="rId2" cstate="print">
+            <a:extLst>
+              <a:ext uri="{28A0092B-C50C-407E-A947-70E740481C1C}">
+                <a14:useLocalDpi xmlns:a14="http://schemas.microsoft.com/office/drawing/2010/main" val="0"/>
+              </a:ext>
+            </a:extLst>
+          </a:blip>
+          <a:stretch>
+            <a:fillRect/>
+          </a:stretch>
+        </p:blipFill>
+        <p:spPr>
+          <a:xfrm>
+            <a:off x="241662" y="152400"/>
+            <a:ext cx="3151778" cy="6557526"/>
+          </a:xfrm>
+          <a:prstGeom prst="rect">
+            <a:avLst/>
+          </a:prstGeom>
+        </p:spPr>
+      </p:pic>
+    </p:spTree>
+    <p:extLst>
+      <p:ext uri="{BB962C8B-B14F-4D97-AF65-F5344CB8AC3E}">
+        <p14:creationId xmlns:p14="http://schemas.microsoft.com/office/powerpoint/2010/main" val="2779047188"/>
       </p:ext>
     </p:extLst>
   </p:cSld>

</xml_diff>

<commit_message>
#18 updated category mock up
</commit_message>
<xml_diff>
--- a/docs/Mock_Up.pptx
+++ b/docs/Mock_Up.pptx
@@ -7,6 +7,8 @@
   <p:sldIdLst>
     <p:sldId id="257" r:id="rId2"/>
     <p:sldId id="256" r:id="rId3"/>
+    <p:sldId id="258" r:id="rId4"/>
+    <p:sldId id="259" r:id="rId5"/>
   </p:sldIdLst>
   <p:sldSz cx="12192000" cy="6858000"/>
   <p:notesSz cx="6858000" cy="9144000"/>
@@ -105,6 +107,11 @@
       </a:defRPr>
     </a:lvl9pPr>
   </p:defaultTextStyle>
+  <p:extLst>
+    <p:ext uri="{EFAFB233-063F-42B5-8137-9DF3F51BA10A}">
+      <p15:sldGuideLst xmlns:p15="http://schemas.microsoft.com/office/powerpoint/2012/main"/>
+    </p:ext>
+  </p:extLst>
 </p:presentation>
 </file>
 
@@ -239,7 +246,7 @@
           <a:p>
             <a:fld id="{1E366D43-31D5-4172-B4EF-92311A1E8CD0}" type="datetimeFigureOut">
               <a:rPr lang="en-US" smtClean="0"/>
-              <a:t>11/26/2021</a:t>
+              <a:t>11/30/2021</a:t>
             </a:fld>
             <a:endParaRPr lang="en-US"/>
           </a:p>
@@ -409,7 +416,7 @@
           <a:p>
             <a:fld id="{1E366D43-31D5-4172-B4EF-92311A1E8CD0}" type="datetimeFigureOut">
               <a:rPr lang="en-US" smtClean="0"/>
-              <a:t>11/26/2021</a:t>
+              <a:t>11/30/2021</a:t>
             </a:fld>
             <a:endParaRPr lang="en-US"/>
           </a:p>
@@ -589,7 +596,7 @@
           <a:p>
             <a:fld id="{1E366D43-31D5-4172-B4EF-92311A1E8CD0}" type="datetimeFigureOut">
               <a:rPr lang="en-US" smtClean="0"/>
-              <a:t>11/26/2021</a:t>
+              <a:t>11/30/2021</a:t>
             </a:fld>
             <a:endParaRPr lang="en-US"/>
           </a:p>
@@ -759,7 +766,7 @@
           <a:p>
             <a:fld id="{1E366D43-31D5-4172-B4EF-92311A1E8CD0}" type="datetimeFigureOut">
               <a:rPr lang="en-US" smtClean="0"/>
-              <a:t>11/26/2021</a:t>
+              <a:t>11/30/2021</a:t>
             </a:fld>
             <a:endParaRPr lang="en-US"/>
           </a:p>
@@ -1005,7 +1012,7 @@
           <a:p>
             <a:fld id="{1E366D43-31D5-4172-B4EF-92311A1E8CD0}" type="datetimeFigureOut">
               <a:rPr lang="en-US" smtClean="0"/>
-              <a:t>11/26/2021</a:t>
+              <a:t>11/30/2021</a:t>
             </a:fld>
             <a:endParaRPr lang="en-US"/>
           </a:p>
@@ -1237,7 +1244,7 @@
           <a:p>
             <a:fld id="{1E366D43-31D5-4172-B4EF-92311A1E8CD0}" type="datetimeFigureOut">
               <a:rPr lang="en-US" smtClean="0"/>
-              <a:t>11/26/2021</a:t>
+              <a:t>11/30/2021</a:t>
             </a:fld>
             <a:endParaRPr lang="en-US"/>
           </a:p>
@@ -1604,7 +1611,7 @@
           <a:p>
             <a:fld id="{1E366D43-31D5-4172-B4EF-92311A1E8CD0}" type="datetimeFigureOut">
               <a:rPr lang="en-US" smtClean="0"/>
-              <a:t>11/26/2021</a:t>
+              <a:t>11/30/2021</a:t>
             </a:fld>
             <a:endParaRPr lang="en-US"/>
           </a:p>
@@ -1722,7 +1729,7 @@
           <a:p>
             <a:fld id="{1E366D43-31D5-4172-B4EF-92311A1E8CD0}" type="datetimeFigureOut">
               <a:rPr lang="en-US" smtClean="0"/>
-              <a:t>11/26/2021</a:t>
+              <a:t>11/30/2021</a:t>
             </a:fld>
             <a:endParaRPr lang="en-US"/>
           </a:p>
@@ -1817,7 +1824,7 @@
           <a:p>
             <a:fld id="{1E366D43-31D5-4172-B4EF-92311A1E8CD0}" type="datetimeFigureOut">
               <a:rPr lang="en-US" smtClean="0"/>
-              <a:t>11/26/2021</a:t>
+              <a:t>11/30/2021</a:t>
             </a:fld>
             <a:endParaRPr lang="en-US"/>
           </a:p>
@@ -2094,7 +2101,7 @@
           <a:p>
             <a:fld id="{1E366D43-31D5-4172-B4EF-92311A1E8CD0}" type="datetimeFigureOut">
               <a:rPr lang="en-US" smtClean="0"/>
-              <a:t>11/26/2021</a:t>
+              <a:t>11/30/2021</a:t>
             </a:fld>
             <a:endParaRPr lang="en-US"/>
           </a:p>
@@ -2347,7 +2354,7 @@
           <a:p>
             <a:fld id="{1E366D43-31D5-4172-B4EF-92311A1E8CD0}" type="datetimeFigureOut">
               <a:rPr lang="en-US" smtClean="0"/>
-              <a:t>11/26/2021</a:t>
+              <a:t>11/30/2021</a:t>
             </a:fld>
             <a:endParaRPr lang="en-US"/>
           </a:p>
@@ -2560,7 +2567,7 @@
           <a:p>
             <a:fld id="{1E366D43-31D5-4172-B4EF-92311A1E8CD0}" type="datetimeFigureOut">
               <a:rPr lang="en-US" smtClean="0"/>
-              <a:t>11/26/2021</a:t>
+              <a:t>11/30/2021</a:t>
             </a:fld>
             <a:endParaRPr lang="en-US"/>
           </a:p>
@@ -3006,7 +3013,6 @@
               <a:rPr lang="en-US" dirty="0"/>
               <a:t>Up</a:t>
             </a:r>
-            <a:endParaRPr lang="en-US" dirty="0"/>
           </a:p>
         </p:txBody>
       </p:sp>
@@ -3233,7 +3239,7 @@
         </p:nvSpPr>
         <p:spPr>
           <a:xfrm>
-            <a:off x="2999923" y="712352"/>
+            <a:off x="2980873" y="493277"/>
             <a:ext cx="6108569" cy="769441"/>
           </a:xfrm>
           <a:prstGeom prst="rect">
@@ -3265,22 +3271,28 @@
       </p:sp>
       <p:pic>
         <p:nvPicPr>
-          <p:cNvPr id="5" name="Picture 4"/>
+          <p:cNvPr id="2" name="Picture 1"/>
           <p:cNvPicPr>
             <a:picLocks noChangeAspect="1"/>
           </p:cNvPicPr>
           <p:nvPr/>
         </p:nvPicPr>
         <p:blipFill>
-          <a:blip r:embed="rId2"/>
+          <a:blip r:embed="rId2" cstate="print">
+            <a:extLst>
+              <a:ext uri="{28A0092B-C50C-407E-A947-70E740481C1C}">
+                <a14:useLocalDpi xmlns:a14="http://schemas.microsoft.com/office/drawing/2010/main" val="0"/>
+              </a:ext>
+            </a:extLst>
+          </a:blip>
           <a:stretch>
             <a:fillRect/>
           </a:stretch>
         </p:blipFill>
         <p:spPr>
           <a:xfrm>
-            <a:off x="2475013" y="1408981"/>
-            <a:ext cx="6867159" cy="4190424"/>
+            <a:off x="2524518" y="1722339"/>
+            <a:ext cx="7276707" cy="4440335"/>
           </a:xfrm>
           <a:prstGeom prst="rect">
             <a:avLst/>
@@ -3291,6 +3303,390 @@
     <p:extLst>
       <p:ext uri="{BB962C8B-B14F-4D97-AF65-F5344CB8AC3E}">
         <p14:creationId xmlns:p14="http://schemas.microsoft.com/office/powerpoint/2010/main" val="1781392023"/>
+      </p:ext>
+    </p:extLst>
+  </p:cSld>
+  <p:clrMapOvr>
+    <a:masterClrMapping/>
+  </p:clrMapOvr>
+</p:sld>
+</file>
+
+<file path=ppt/slides/slide3.xml><?xml version="1.0" encoding="utf-8"?>
+<p:sld xmlns:a="http://schemas.openxmlformats.org/drawingml/2006/main" xmlns:r="http://schemas.openxmlformats.org/officeDocument/2006/relationships" xmlns:p="http://schemas.openxmlformats.org/presentationml/2006/main">
+  <p:cSld>
+    <p:spTree>
+      <p:nvGrpSpPr>
+        <p:cNvPr id="1" name=""/>
+        <p:cNvGrpSpPr/>
+        <p:nvPr/>
+      </p:nvGrpSpPr>
+      <p:grpSpPr>
+        <a:xfrm>
+          <a:off x="0" y="0"/>
+          <a:ext cx="0" cy="0"/>
+          <a:chOff x="0" y="0"/>
+          <a:chExt cx="0" cy="0"/>
+        </a:xfrm>
+      </p:grpSpPr>
+      <p:sp>
+        <p:nvSpPr>
+          <p:cNvPr id="4" name="TextBox 3"/>
+          <p:cNvSpPr txBox="1"/>
+          <p:nvPr/>
+        </p:nvSpPr>
+        <p:spPr>
+          <a:xfrm>
+            <a:off x="4194240" y="386804"/>
+            <a:ext cx="3701985" cy="769441"/>
+          </a:xfrm>
+          <a:prstGeom prst="rect">
+            <a:avLst/>
+          </a:prstGeom>
+          <a:noFill/>
+        </p:spPr>
+        <p:txBody>
+          <a:bodyPr wrap="square" rtlCol="0">
+            <a:spAutoFit/>
+          </a:bodyPr>
+          <a:lstStyle>
+            <a:defPPr>
+              <a:defRPr lang="en-US"/>
+            </a:defPPr>
+            <a:lvl1pPr marL="0" algn="l" defTabSz="914400" rtl="0" eaLnBrk="1" latinLnBrk="0" hangingPunct="1">
+              <a:defRPr sz="1800" kern="1200">
+                <a:solidFill>
+                  <a:schemeClr val="tx1"/>
+                </a:solidFill>
+                <a:latin typeface="+mn-lt"/>
+                <a:ea typeface="+mn-ea"/>
+                <a:cs typeface="+mn-cs"/>
+              </a:defRPr>
+            </a:lvl1pPr>
+            <a:lvl2pPr marL="457200" algn="l" defTabSz="914400" rtl="0" eaLnBrk="1" latinLnBrk="0" hangingPunct="1">
+              <a:defRPr sz="1800" kern="1200">
+                <a:solidFill>
+                  <a:schemeClr val="tx1"/>
+                </a:solidFill>
+                <a:latin typeface="+mn-lt"/>
+                <a:ea typeface="+mn-ea"/>
+                <a:cs typeface="+mn-cs"/>
+              </a:defRPr>
+            </a:lvl2pPr>
+            <a:lvl3pPr marL="914400" algn="l" defTabSz="914400" rtl="0" eaLnBrk="1" latinLnBrk="0" hangingPunct="1">
+              <a:defRPr sz="1800" kern="1200">
+                <a:solidFill>
+                  <a:schemeClr val="tx1"/>
+                </a:solidFill>
+                <a:latin typeface="+mn-lt"/>
+                <a:ea typeface="+mn-ea"/>
+                <a:cs typeface="+mn-cs"/>
+              </a:defRPr>
+            </a:lvl3pPr>
+            <a:lvl4pPr marL="1371600" algn="l" defTabSz="914400" rtl="0" eaLnBrk="1" latinLnBrk="0" hangingPunct="1">
+              <a:defRPr sz="1800" kern="1200">
+                <a:solidFill>
+                  <a:schemeClr val="tx1"/>
+                </a:solidFill>
+                <a:latin typeface="+mn-lt"/>
+                <a:ea typeface="+mn-ea"/>
+                <a:cs typeface="+mn-cs"/>
+              </a:defRPr>
+            </a:lvl4pPr>
+            <a:lvl5pPr marL="1828800" algn="l" defTabSz="914400" rtl="0" eaLnBrk="1" latinLnBrk="0" hangingPunct="1">
+              <a:defRPr sz="1800" kern="1200">
+                <a:solidFill>
+                  <a:schemeClr val="tx1"/>
+                </a:solidFill>
+                <a:latin typeface="+mn-lt"/>
+                <a:ea typeface="+mn-ea"/>
+                <a:cs typeface="+mn-cs"/>
+              </a:defRPr>
+            </a:lvl5pPr>
+            <a:lvl6pPr marL="2286000" algn="l" defTabSz="914400" rtl="0" eaLnBrk="1" latinLnBrk="0" hangingPunct="1">
+              <a:defRPr sz="1800" kern="1200">
+                <a:solidFill>
+                  <a:schemeClr val="tx1"/>
+                </a:solidFill>
+                <a:latin typeface="+mn-lt"/>
+                <a:ea typeface="+mn-ea"/>
+                <a:cs typeface="+mn-cs"/>
+              </a:defRPr>
+            </a:lvl6pPr>
+            <a:lvl7pPr marL="2743200" algn="l" defTabSz="914400" rtl="0" eaLnBrk="1" latinLnBrk="0" hangingPunct="1">
+              <a:defRPr sz="1800" kern="1200">
+                <a:solidFill>
+                  <a:schemeClr val="tx1"/>
+                </a:solidFill>
+                <a:latin typeface="+mn-lt"/>
+                <a:ea typeface="+mn-ea"/>
+                <a:cs typeface="+mn-cs"/>
+              </a:defRPr>
+            </a:lvl7pPr>
+            <a:lvl8pPr marL="3200400" algn="l" defTabSz="914400" rtl="0" eaLnBrk="1" latinLnBrk="0" hangingPunct="1">
+              <a:defRPr sz="1800" kern="1200">
+                <a:solidFill>
+                  <a:schemeClr val="tx1"/>
+                </a:solidFill>
+                <a:latin typeface="+mn-lt"/>
+                <a:ea typeface="+mn-ea"/>
+                <a:cs typeface="+mn-cs"/>
+              </a:defRPr>
+            </a:lvl8pPr>
+            <a:lvl9pPr marL="3657600" algn="l" defTabSz="914400" rtl="0" eaLnBrk="1" latinLnBrk="0" hangingPunct="1">
+              <a:defRPr sz="1800" kern="1200">
+                <a:solidFill>
+                  <a:schemeClr val="tx1"/>
+                </a:solidFill>
+                <a:latin typeface="+mn-lt"/>
+                <a:ea typeface="+mn-ea"/>
+                <a:cs typeface="+mn-cs"/>
+              </a:defRPr>
+            </a:lvl9pPr>
+          </a:lstStyle>
+          <a:p>
+            <a:r>
+              <a:rPr lang="en-US" sz="4400" dirty="0" smtClean="0">
+                <a:solidFill>
+                  <a:srgbClr val="FF0000"/>
+                </a:solidFill>
+              </a:rPr>
+              <a:t>Menu Mock Up</a:t>
+            </a:r>
+            <a:endParaRPr lang="en-US" sz="4400" dirty="0">
+              <a:solidFill>
+                <a:srgbClr val="FF0000"/>
+              </a:solidFill>
+            </a:endParaRPr>
+          </a:p>
+        </p:txBody>
+      </p:sp>
+      <p:pic>
+        <p:nvPicPr>
+          <p:cNvPr id="5" name="Picture 4"/>
+          <p:cNvPicPr>
+            <a:picLocks noChangeAspect="1"/>
+          </p:cNvPicPr>
+          <p:nvPr/>
+        </p:nvPicPr>
+        <p:blipFill>
+          <a:blip r:embed="rId2">
+            <a:extLst>
+              <a:ext uri="{28A0092B-C50C-407E-A947-70E740481C1C}">
+                <a14:useLocalDpi xmlns:a14="http://schemas.microsoft.com/office/drawing/2010/main" val="0"/>
+              </a:ext>
+            </a:extLst>
+          </a:blip>
+          <a:stretch>
+            <a:fillRect/>
+          </a:stretch>
+        </p:blipFill>
+        <p:spPr>
+          <a:xfrm>
+            <a:off x="2419350" y="1377950"/>
+            <a:ext cx="7562850" cy="5041900"/>
+          </a:xfrm>
+          <a:prstGeom prst="rect">
+            <a:avLst/>
+          </a:prstGeom>
+        </p:spPr>
+      </p:pic>
+    </p:spTree>
+    <p:extLst>
+      <p:ext uri="{BB962C8B-B14F-4D97-AF65-F5344CB8AC3E}">
+        <p14:creationId xmlns:p14="http://schemas.microsoft.com/office/powerpoint/2010/main" val="674809515"/>
+      </p:ext>
+    </p:extLst>
+  </p:cSld>
+  <p:clrMapOvr>
+    <a:masterClrMapping/>
+  </p:clrMapOvr>
+</p:sld>
+</file>
+
+<file path=ppt/slides/slide4.xml><?xml version="1.0" encoding="utf-8"?>
+<p:sld xmlns:a="http://schemas.openxmlformats.org/drawingml/2006/main" xmlns:r="http://schemas.openxmlformats.org/officeDocument/2006/relationships" xmlns:p="http://schemas.openxmlformats.org/presentationml/2006/main">
+  <p:cSld>
+    <p:spTree>
+      <p:nvGrpSpPr>
+        <p:cNvPr id="1" name=""/>
+        <p:cNvGrpSpPr/>
+        <p:nvPr/>
+      </p:nvGrpSpPr>
+      <p:grpSpPr>
+        <a:xfrm>
+          <a:off x="0" y="0"/>
+          <a:ext cx="0" cy="0"/>
+          <a:chOff x="0" y="0"/>
+          <a:chExt cx="0" cy="0"/>
+        </a:xfrm>
+      </p:grpSpPr>
+      <p:sp>
+        <p:nvSpPr>
+          <p:cNvPr id="4" name="TextBox 3"/>
+          <p:cNvSpPr txBox="1"/>
+          <p:nvPr/>
+        </p:nvSpPr>
+        <p:spPr>
+          <a:xfrm>
+            <a:off x="5451540" y="2796629"/>
+            <a:ext cx="6108569" cy="769441"/>
+          </a:xfrm>
+          <a:prstGeom prst="rect">
+            <a:avLst/>
+          </a:prstGeom>
+          <a:noFill/>
+        </p:spPr>
+        <p:txBody>
+          <a:bodyPr wrap="square" rtlCol="0">
+            <a:spAutoFit/>
+          </a:bodyPr>
+          <a:lstStyle>
+            <a:defPPr>
+              <a:defRPr lang="en-US"/>
+            </a:defPPr>
+            <a:lvl1pPr marL="0" algn="l" defTabSz="914400" rtl="0" eaLnBrk="1" latinLnBrk="0" hangingPunct="1">
+              <a:defRPr sz="1800" kern="1200">
+                <a:solidFill>
+                  <a:schemeClr val="tx1"/>
+                </a:solidFill>
+                <a:latin typeface="+mn-lt"/>
+                <a:ea typeface="+mn-ea"/>
+                <a:cs typeface="+mn-cs"/>
+              </a:defRPr>
+            </a:lvl1pPr>
+            <a:lvl2pPr marL="457200" algn="l" defTabSz="914400" rtl="0" eaLnBrk="1" latinLnBrk="0" hangingPunct="1">
+              <a:defRPr sz="1800" kern="1200">
+                <a:solidFill>
+                  <a:schemeClr val="tx1"/>
+                </a:solidFill>
+                <a:latin typeface="+mn-lt"/>
+                <a:ea typeface="+mn-ea"/>
+                <a:cs typeface="+mn-cs"/>
+              </a:defRPr>
+            </a:lvl2pPr>
+            <a:lvl3pPr marL="914400" algn="l" defTabSz="914400" rtl="0" eaLnBrk="1" latinLnBrk="0" hangingPunct="1">
+              <a:defRPr sz="1800" kern="1200">
+                <a:solidFill>
+                  <a:schemeClr val="tx1"/>
+                </a:solidFill>
+                <a:latin typeface="+mn-lt"/>
+                <a:ea typeface="+mn-ea"/>
+                <a:cs typeface="+mn-cs"/>
+              </a:defRPr>
+            </a:lvl3pPr>
+            <a:lvl4pPr marL="1371600" algn="l" defTabSz="914400" rtl="0" eaLnBrk="1" latinLnBrk="0" hangingPunct="1">
+              <a:defRPr sz="1800" kern="1200">
+                <a:solidFill>
+                  <a:schemeClr val="tx1"/>
+                </a:solidFill>
+                <a:latin typeface="+mn-lt"/>
+                <a:ea typeface="+mn-ea"/>
+                <a:cs typeface="+mn-cs"/>
+              </a:defRPr>
+            </a:lvl4pPr>
+            <a:lvl5pPr marL="1828800" algn="l" defTabSz="914400" rtl="0" eaLnBrk="1" latinLnBrk="0" hangingPunct="1">
+              <a:defRPr sz="1800" kern="1200">
+                <a:solidFill>
+                  <a:schemeClr val="tx1"/>
+                </a:solidFill>
+                <a:latin typeface="+mn-lt"/>
+                <a:ea typeface="+mn-ea"/>
+                <a:cs typeface="+mn-cs"/>
+              </a:defRPr>
+            </a:lvl5pPr>
+            <a:lvl6pPr marL="2286000" algn="l" defTabSz="914400" rtl="0" eaLnBrk="1" latinLnBrk="0" hangingPunct="1">
+              <a:defRPr sz="1800" kern="1200">
+                <a:solidFill>
+                  <a:schemeClr val="tx1"/>
+                </a:solidFill>
+                <a:latin typeface="+mn-lt"/>
+                <a:ea typeface="+mn-ea"/>
+                <a:cs typeface="+mn-cs"/>
+              </a:defRPr>
+            </a:lvl6pPr>
+            <a:lvl7pPr marL="2743200" algn="l" defTabSz="914400" rtl="0" eaLnBrk="1" latinLnBrk="0" hangingPunct="1">
+              <a:defRPr sz="1800" kern="1200">
+                <a:solidFill>
+                  <a:schemeClr val="tx1"/>
+                </a:solidFill>
+                <a:latin typeface="+mn-lt"/>
+                <a:ea typeface="+mn-ea"/>
+                <a:cs typeface="+mn-cs"/>
+              </a:defRPr>
+            </a:lvl7pPr>
+            <a:lvl8pPr marL="3200400" algn="l" defTabSz="914400" rtl="0" eaLnBrk="1" latinLnBrk="0" hangingPunct="1">
+              <a:defRPr sz="1800" kern="1200">
+                <a:solidFill>
+                  <a:schemeClr val="tx1"/>
+                </a:solidFill>
+                <a:latin typeface="+mn-lt"/>
+                <a:ea typeface="+mn-ea"/>
+                <a:cs typeface="+mn-cs"/>
+              </a:defRPr>
+            </a:lvl8pPr>
+            <a:lvl9pPr marL="3657600" algn="l" defTabSz="914400" rtl="0" eaLnBrk="1" latinLnBrk="0" hangingPunct="1">
+              <a:defRPr sz="1800" kern="1200">
+                <a:solidFill>
+                  <a:schemeClr val="tx1"/>
+                </a:solidFill>
+                <a:latin typeface="+mn-lt"/>
+                <a:ea typeface="+mn-ea"/>
+                <a:cs typeface="+mn-cs"/>
+              </a:defRPr>
+            </a:lvl9pPr>
+          </a:lstStyle>
+          <a:p>
+            <a:r>
+              <a:rPr lang="en-US" sz="4400" dirty="0" smtClean="0">
+                <a:solidFill>
+                  <a:srgbClr val="FF0000"/>
+                </a:solidFill>
+              </a:rPr>
+              <a:t>Category Mock Up</a:t>
+            </a:r>
+            <a:endParaRPr lang="en-US" sz="4400" dirty="0">
+              <a:solidFill>
+                <a:srgbClr val="FF0000"/>
+              </a:solidFill>
+            </a:endParaRPr>
+          </a:p>
+        </p:txBody>
+      </p:sp>
+      <p:pic>
+        <p:nvPicPr>
+          <p:cNvPr id="5" name="Picture 4"/>
+          <p:cNvPicPr>
+            <a:picLocks noChangeAspect="1"/>
+          </p:cNvPicPr>
+          <p:nvPr/>
+        </p:nvPicPr>
+        <p:blipFill>
+          <a:blip r:embed="rId2" cstate="print">
+            <a:extLst>
+              <a:ext uri="{28A0092B-C50C-407E-A947-70E740481C1C}">
+                <a14:useLocalDpi xmlns:a14="http://schemas.microsoft.com/office/drawing/2010/main" val="0"/>
+              </a:ext>
+            </a:extLst>
+          </a:blip>
+          <a:stretch>
+            <a:fillRect/>
+          </a:stretch>
+        </p:blipFill>
+        <p:spPr>
+          <a:xfrm>
+            <a:off x="87351" y="95249"/>
+            <a:ext cx="3218369" cy="6696075"/>
+          </a:xfrm>
+          <a:prstGeom prst="rect">
+            <a:avLst/>
+          </a:prstGeom>
+        </p:spPr>
+      </p:pic>
+    </p:spTree>
+    <p:extLst>
+      <p:ext uri="{BB962C8B-B14F-4D97-AF65-F5344CB8AC3E}">
+        <p14:creationId xmlns:p14="http://schemas.microsoft.com/office/powerpoint/2010/main" val="2361887223"/>
       </p:ext>
     </p:extLst>
   </p:cSld>

</xml_diff>

<commit_message>
#29 event Mock Up was updated
</commit_message>
<xml_diff>
--- a/docs/Mock_Up.pptx
+++ b/docs/Mock_Up.pptx
@@ -9,6 +9,7 @@
     <p:sldId id="256" r:id="rId3"/>
     <p:sldId id="258" r:id="rId4"/>
     <p:sldId id="259" r:id="rId5"/>
+    <p:sldId id="260" r:id="rId6"/>
   </p:sldIdLst>
   <p:sldSz cx="12192000" cy="6858000"/>
   <p:notesSz cx="6858000" cy="9144000"/>
@@ -246,7 +247,7 @@
           <a:p>
             <a:fld id="{1E366D43-31D5-4172-B4EF-92311A1E8CD0}" type="datetimeFigureOut">
               <a:rPr lang="en-US" smtClean="0"/>
-              <a:t>11/30/2021</a:t>
+              <a:t>12/2/2021</a:t>
             </a:fld>
             <a:endParaRPr lang="en-US"/>
           </a:p>
@@ -416,7 +417,7 @@
           <a:p>
             <a:fld id="{1E366D43-31D5-4172-B4EF-92311A1E8CD0}" type="datetimeFigureOut">
               <a:rPr lang="en-US" smtClean="0"/>
-              <a:t>11/30/2021</a:t>
+              <a:t>12/2/2021</a:t>
             </a:fld>
             <a:endParaRPr lang="en-US"/>
           </a:p>
@@ -596,7 +597,7 @@
           <a:p>
             <a:fld id="{1E366D43-31D5-4172-B4EF-92311A1E8CD0}" type="datetimeFigureOut">
               <a:rPr lang="en-US" smtClean="0"/>
-              <a:t>11/30/2021</a:t>
+              <a:t>12/2/2021</a:t>
             </a:fld>
             <a:endParaRPr lang="en-US"/>
           </a:p>
@@ -766,7 +767,7 @@
           <a:p>
             <a:fld id="{1E366D43-31D5-4172-B4EF-92311A1E8CD0}" type="datetimeFigureOut">
               <a:rPr lang="en-US" smtClean="0"/>
-              <a:t>11/30/2021</a:t>
+              <a:t>12/2/2021</a:t>
             </a:fld>
             <a:endParaRPr lang="en-US"/>
           </a:p>
@@ -1012,7 +1013,7 @@
           <a:p>
             <a:fld id="{1E366D43-31D5-4172-B4EF-92311A1E8CD0}" type="datetimeFigureOut">
               <a:rPr lang="en-US" smtClean="0"/>
-              <a:t>11/30/2021</a:t>
+              <a:t>12/2/2021</a:t>
             </a:fld>
             <a:endParaRPr lang="en-US"/>
           </a:p>
@@ -1244,7 +1245,7 @@
           <a:p>
             <a:fld id="{1E366D43-31D5-4172-B4EF-92311A1E8CD0}" type="datetimeFigureOut">
               <a:rPr lang="en-US" smtClean="0"/>
-              <a:t>11/30/2021</a:t>
+              <a:t>12/2/2021</a:t>
             </a:fld>
             <a:endParaRPr lang="en-US"/>
           </a:p>
@@ -1611,7 +1612,7 @@
           <a:p>
             <a:fld id="{1E366D43-31D5-4172-B4EF-92311A1E8CD0}" type="datetimeFigureOut">
               <a:rPr lang="en-US" smtClean="0"/>
-              <a:t>11/30/2021</a:t>
+              <a:t>12/2/2021</a:t>
             </a:fld>
             <a:endParaRPr lang="en-US"/>
           </a:p>
@@ -1729,7 +1730,7 @@
           <a:p>
             <a:fld id="{1E366D43-31D5-4172-B4EF-92311A1E8CD0}" type="datetimeFigureOut">
               <a:rPr lang="en-US" smtClean="0"/>
-              <a:t>11/30/2021</a:t>
+              <a:t>12/2/2021</a:t>
             </a:fld>
             <a:endParaRPr lang="en-US"/>
           </a:p>
@@ -1824,7 +1825,7 @@
           <a:p>
             <a:fld id="{1E366D43-31D5-4172-B4EF-92311A1E8CD0}" type="datetimeFigureOut">
               <a:rPr lang="en-US" smtClean="0"/>
-              <a:t>11/30/2021</a:t>
+              <a:t>12/2/2021</a:t>
             </a:fld>
             <a:endParaRPr lang="en-US"/>
           </a:p>
@@ -2101,7 +2102,7 @@
           <a:p>
             <a:fld id="{1E366D43-31D5-4172-B4EF-92311A1E8CD0}" type="datetimeFigureOut">
               <a:rPr lang="en-US" smtClean="0"/>
-              <a:t>11/30/2021</a:t>
+              <a:t>12/2/2021</a:t>
             </a:fld>
             <a:endParaRPr lang="en-US"/>
           </a:p>
@@ -2354,7 +2355,7 @@
           <a:p>
             <a:fld id="{1E366D43-31D5-4172-B4EF-92311A1E8CD0}" type="datetimeFigureOut">
               <a:rPr lang="en-US" smtClean="0"/>
-              <a:t>11/30/2021</a:t>
+              <a:t>12/2/2021</a:t>
             </a:fld>
             <a:endParaRPr lang="en-US"/>
           </a:p>
@@ -2567,7 +2568,7 @@
           <a:p>
             <a:fld id="{1E366D43-31D5-4172-B4EF-92311A1E8CD0}" type="datetimeFigureOut">
               <a:rPr lang="en-US" smtClean="0"/>
-              <a:t>11/30/2021</a:t>
+              <a:t>12/2/2021</a:t>
             </a:fld>
             <a:endParaRPr lang="en-US"/>
           </a:p>
@@ -3696,6 +3697,214 @@
 </p:sld>
 </file>
 
+<file path=ppt/slides/slide5.xml><?xml version="1.0" encoding="utf-8"?>
+<p:sld xmlns:a="http://schemas.openxmlformats.org/drawingml/2006/main" xmlns:r="http://schemas.openxmlformats.org/officeDocument/2006/relationships" xmlns:p="http://schemas.openxmlformats.org/presentationml/2006/main">
+  <p:cSld>
+    <p:spTree>
+      <p:nvGrpSpPr>
+        <p:cNvPr id="1" name=""/>
+        <p:cNvGrpSpPr/>
+        <p:nvPr/>
+      </p:nvGrpSpPr>
+      <p:grpSpPr>
+        <a:xfrm>
+          <a:off x="0" y="0"/>
+          <a:ext cx="0" cy="0"/>
+          <a:chOff x="0" y="0"/>
+          <a:chExt cx="0" cy="0"/>
+        </a:xfrm>
+      </p:grpSpPr>
+      <p:sp>
+        <p:nvSpPr>
+          <p:cNvPr id="4" name="TextBox 3"/>
+          <p:cNvSpPr txBox="1"/>
+          <p:nvPr/>
+        </p:nvSpPr>
+        <p:spPr>
+          <a:xfrm>
+            <a:off x="6083431" y="2826246"/>
+            <a:ext cx="6108569" cy="769441"/>
+          </a:xfrm>
+          <a:prstGeom prst="rect">
+            <a:avLst/>
+          </a:prstGeom>
+          <a:noFill/>
+        </p:spPr>
+        <p:txBody>
+          <a:bodyPr wrap="square" rtlCol="0">
+            <a:spAutoFit/>
+          </a:bodyPr>
+          <a:lstStyle>
+            <a:defPPr>
+              <a:defRPr lang="en-US"/>
+            </a:defPPr>
+            <a:lvl1pPr marL="0" algn="l" defTabSz="914400" rtl="0" eaLnBrk="1" latinLnBrk="0" hangingPunct="1">
+              <a:defRPr sz="1800" kern="1200">
+                <a:solidFill>
+                  <a:schemeClr val="tx1"/>
+                </a:solidFill>
+                <a:latin typeface="+mn-lt"/>
+                <a:ea typeface="+mn-ea"/>
+                <a:cs typeface="+mn-cs"/>
+              </a:defRPr>
+            </a:lvl1pPr>
+            <a:lvl2pPr marL="457200" algn="l" defTabSz="914400" rtl="0" eaLnBrk="1" latinLnBrk="0" hangingPunct="1">
+              <a:defRPr sz="1800" kern="1200">
+                <a:solidFill>
+                  <a:schemeClr val="tx1"/>
+                </a:solidFill>
+                <a:latin typeface="+mn-lt"/>
+                <a:ea typeface="+mn-ea"/>
+                <a:cs typeface="+mn-cs"/>
+              </a:defRPr>
+            </a:lvl2pPr>
+            <a:lvl3pPr marL="914400" algn="l" defTabSz="914400" rtl="0" eaLnBrk="1" latinLnBrk="0" hangingPunct="1">
+              <a:defRPr sz="1800" kern="1200">
+                <a:solidFill>
+                  <a:schemeClr val="tx1"/>
+                </a:solidFill>
+                <a:latin typeface="+mn-lt"/>
+                <a:ea typeface="+mn-ea"/>
+                <a:cs typeface="+mn-cs"/>
+              </a:defRPr>
+            </a:lvl3pPr>
+            <a:lvl4pPr marL="1371600" algn="l" defTabSz="914400" rtl="0" eaLnBrk="1" latinLnBrk="0" hangingPunct="1">
+              <a:defRPr sz="1800" kern="1200">
+                <a:solidFill>
+                  <a:schemeClr val="tx1"/>
+                </a:solidFill>
+                <a:latin typeface="+mn-lt"/>
+                <a:ea typeface="+mn-ea"/>
+                <a:cs typeface="+mn-cs"/>
+              </a:defRPr>
+            </a:lvl4pPr>
+            <a:lvl5pPr marL="1828800" algn="l" defTabSz="914400" rtl="0" eaLnBrk="1" latinLnBrk="0" hangingPunct="1">
+              <a:defRPr sz="1800" kern="1200">
+                <a:solidFill>
+                  <a:schemeClr val="tx1"/>
+                </a:solidFill>
+                <a:latin typeface="+mn-lt"/>
+                <a:ea typeface="+mn-ea"/>
+                <a:cs typeface="+mn-cs"/>
+              </a:defRPr>
+            </a:lvl5pPr>
+            <a:lvl6pPr marL="2286000" algn="l" defTabSz="914400" rtl="0" eaLnBrk="1" latinLnBrk="0" hangingPunct="1">
+              <a:defRPr sz="1800" kern="1200">
+                <a:solidFill>
+                  <a:schemeClr val="tx1"/>
+                </a:solidFill>
+                <a:latin typeface="+mn-lt"/>
+                <a:ea typeface="+mn-ea"/>
+                <a:cs typeface="+mn-cs"/>
+              </a:defRPr>
+            </a:lvl6pPr>
+            <a:lvl7pPr marL="2743200" algn="l" defTabSz="914400" rtl="0" eaLnBrk="1" latinLnBrk="0" hangingPunct="1">
+              <a:defRPr sz="1800" kern="1200">
+                <a:solidFill>
+                  <a:schemeClr val="tx1"/>
+                </a:solidFill>
+                <a:latin typeface="+mn-lt"/>
+                <a:ea typeface="+mn-ea"/>
+                <a:cs typeface="+mn-cs"/>
+              </a:defRPr>
+            </a:lvl7pPr>
+            <a:lvl8pPr marL="3200400" algn="l" defTabSz="914400" rtl="0" eaLnBrk="1" latinLnBrk="0" hangingPunct="1">
+              <a:defRPr sz="1800" kern="1200">
+                <a:solidFill>
+                  <a:schemeClr val="tx1"/>
+                </a:solidFill>
+                <a:latin typeface="+mn-lt"/>
+                <a:ea typeface="+mn-ea"/>
+                <a:cs typeface="+mn-cs"/>
+              </a:defRPr>
+            </a:lvl8pPr>
+            <a:lvl9pPr marL="3657600" algn="l" defTabSz="914400" rtl="0" eaLnBrk="1" latinLnBrk="0" hangingPunct="1">
+              <a:defRPr sz="1800" kern="1200">
+                <a:solidFill>
+                  <a:schemeClr val="tx1"/>
+                </a:solidFill>
+                <a:latin typeface="+mn-lt"/>
+                <a:ea typeface="+mn-ea"/>
+                <a:cs typeface="+mn-cs"/>
+              </a:defRPr>
+            </a:lvl9pPr>
+          </a:lstStyle>
+          <a:p>
+            <a:r>
+              <a:rPr lang="en-US" sz="4400" dirty="0" smtClean="0">
+                <a:solidFill>
+                  <a:srgbClr val="FF0000"/>
+                </a:solidFill>
+              </a:rPr>
+              <a:t>Event</a:t>
+            </a:r>
+            <a:r>
+              <a:rPr lang="en-US" sz="4400" dirty="0" smtClean="0">
+                <a:solidFill>
+                  <a:srgbClr val="FF0000"/>
+                </a:solidFill>
+              </a:rPr>
+              <a:t> </a:t>
+            </a:r>
+            <a:r>
+              <a:rPr lang="en-US" sz="4400" dirty="0" smtClean="0">
+                <a:solidFill>
+                  <a:srgbClr val="FF0000"/>
+                </a:solidFill>
+              </a:rPr>
+              <a:t>Mock Up</a:t>
+            </a:r>
+            <a:endParaRPr lang="en-US" sz="4400" dirty="0">
+              <a:solidFill>
+                <a:srgbClr val="FF0000"/>
+              </a:solidFill>
+            </a:endParaRPr>
+          </a:p>
+        </p:txBody>
+      </p:sp>
+      <p:pic>
+        <p:nvPicPr>
+          <p:cNvPr id="5" name="Picture 4"/>
+          <p:cNvPicPr>
+            <a:picLocks noChangeAspect="1"/>
+          </p:cNvPicPr>
+          <p:nvPr/>
+        </p:nvPicPr>
+        <p:blipFill>
+          <a:blip r:embed="rId2" cstate="print">
+            <a:extLst>
+              <a:ext uri="{28A0092B-C50C-407E-A947-70E740481C1C}">
+                <a14:useLocalDpi xmlns:a14="http://schemas.microsoft.com/office/drawing/2010/main" val="0"/>
+              </a:ext>
+            </a:extLst>
+          </a:blip>
+          <a:stretch>
+            <a:fillRect/>
+          </a:stretch>
+        </p:blipFill>
+        <p:spPr>
+          <a:xfrm>
+            <a:off x="120033" y="110578"/>
+            <a:ext cx="3108942" cy="6646272"/>
+          </a:xfrm>
+          <a:prstGeom prst="rect">
+            <a:avLst/>
+          </a:prstGeom>
+        </p:spPr>
+      </p:pic>
+    </p:spTree>
+    <p:extLst>
+      <p:ext uri="{BB962C8B-B14F-4D97-AF65-F5344CB8AC3E}">
+        <p14:creationId xmlns:p14="http://schemas.microsoft.com/office/powerpoint/2010/main" val="1428805440"/>
+      </p:ext>
+    </p:extLst>
+  </p:cSld>
+  <p:clrMapOvr>
+    <a:masterClrMapping/>
+  </p:clrMapOvr>
+</p:sld>
+</file>
+
 <file path=ppt/theme/theme1.xml><?xml version="1.0" encoding="utf-8"?>
 <a:theme xmlns:a="http://schemas.openxmlformats.org/drawingml/2006/main" name="Office Theme">
   <a:themeElements>

</xml_diff>